<commit_message>
added an instruction phase with a new coin
</commit_message>
<xml_diff>
--- a/instructions.pptx
+++ b/instructions.pptx
@@ -116,7 +116,7 @@
 <file path=ppt/revisionInfo.xml><?xml version="1.0" encoding="utf-8"?>
 <p1510:revInfo xmlns:a="http://schemas.openxmlformats.org/drawingml/2006/main" xmlns:r="http://schemas.openxmlformats.org/officeDocument/2006/relationships" xmlns:p1510="http://schemas.microsoft.com/office/powerpoint/2015/10/main">
   <p1510:revLst>
-    <p1510:client id="{5C71AA42-7C81-451D-8AF1-BA5B39FB2CF2}" v="12" dt="2023-03-20T07:28:02.046"/>
+    <p1510:client id="{31765B9D-4116-4D11-B2D1-2419196A75A4}" v="6" dt="2023-05-02T10:39:24.602"/>
   </p1510:revLst>
 </p1510:revInfo>
 </file>
@@ -682,6 +682,141 @@
       </pc:sldMasterChg>
     </pc:docChg>
   </pc:docChgLst>
+  <pc:docChgLst>
+    <pc:chgData name="Snir Barzilay" userId="25ae7c42a3a23ea8" providerId="LiveId" clId="{31765B9D-4116-4D11-B2D1-2419196A75A4}"/>
+    <pc:docChg chg="undo custSel modSld">
+      <pc:chgData name="Snir Barzilay" userId="25ae7c42a3a23ea8" providerId="LiveId" clId="{31765B9D-4116-4D11-B2D1-2419196A75A4}" dt="2023-05-02T10:39:24.591" v="244" actId="14826"/>
+      <pc:docMkLst>
+        <pc:docMk/>
+      </pc:docMkLst>
+      <pc:sldChg chg="modSp mod">
+        <pc:chgData name="Snir Barzilay" userId="25ae7c42a3a23ea8" providerId="LiveId" clId="{31765B9D-4116-4D11-B2D1-2419196A75A4}" dt="2023-05-02T10:38:54.297" v="241" actId="14826"/>
+        <pc:sldMkLst>
+          <pc:docMk/>
+          <pc:sldMk cId="3879652901" sldId="256"/>
+        </pc:sldMkLst>
+        <pc:spChg chg="mod">
+          <ac:chgData name="Snir Barzilay" userId="25ae7c42a3a23ea8" providerId="LiveId" clId="{31765B9D-4116-4D11-B2D1-2419196A75A4}" dt="2023-05-02T10:03:40.780" v="9" actId="122"/>
+          <ac:spMkLst>
+            <pc:docMk/>
+            <pc:sldMk cId="3879652901" sldId="256"/>
+            <ac:spMk id="4" creationId="{14610072-524F-1463-E51C-B5606B4B245B}"/>
+          </ac:spMkLst>
+        </pc:spChg>
+        <pc:spChg chg="mod">
+          <ac:chgData name="Snir Barzilay" userId="25ae7c42a3a23ea8" providerId="LiveId" clId="{31765B9D-4116-4D11-B2D1-2419196A75A4}" dt="2023-05-02T10:03:42.241" v="10" actId="122"/>
+          <ac:spMkLst>
+            <pc:docMk/>
+            <pc:sldMk cId="3879652901" sldId="256"/>
+            <ac:spMk id="8" creationId="{461EB362-8CC4-3AD7-12D9-B0DEECDAD8D1}"/>
+          </ac:spMkLst>
+        </pc:spChg>
+        <pc:spChg chg="mod">
+          <ac:chgData name="Snir Barzilay" userId="25ae7c42a3a23ea8" providerId="LiveId" clId="{31765B9D-4116-4D11-B2D1-2419196A75A4}" dt="2023-05-02T10:03:50.686" v="12" actId="1076"/>
+          <ac:spMkLst>
+            <pc:docMk/>
+            <pc:sldMk cId="3879652901" sldId="256"/>
+            <ac:spMk id="10" creationId="{AF5C1BCB-FD5D-F37C-7541-60C4998F365D}"/>
+          </ac:spMkLst>
+        </pc:spChg>
+        <pc:spChg chg="mod">
+          <ac:chgData name="Snir Barzilay" userId="25ae7c42a3a23ea8" providerId="LiveId" clId="{31765B9D-4116-4D11-B2D1-2419196A75A4}" dt="2023-05-02T10:03:31.764" v="7" actId="1076"/>
+          <ac:spMkLst>
+            <pc:docMk/>
+            <pc:sldMk cId="3879652901" sldId="256"/>
+            <ac:spMk id="15" creationId="{A70BA71A-A026-8B1C-1927-C10CFAECF46B}"/>
+          </ac:spMkLst>
+        </pc:spChg>
+        <pc:picChg chg="mod">
+          <ac:chgData name="Snir Barzilay" userId="25ae7c42a3a23ea8" providerId="LiveId" clId="{31765B9D-4116-4D11-B2D1-2419196A75A4}" dt="2023-05-02T10:38:42.439" v="240" actId="14826"/>
+          <ac:picMkLst>
+            <pc:docMk/>
+            <pc:sldMk cId="3879652901" sldId="256"/>
+            <ac:picMk id="3" creationId="{642C228D-8C30-8564-3D78-6B9C312AEB6B}"/>
+          </ac:picMkLst>
+        </pc:picChg>
+        <pc:picChg chg="mod">
+          <ac:chgData name="Snir Barzilay" userId="25ae7c42a3a23ea8" providerId="LiveId" clId="{31765B9D-4116-4D11-B2D1-2419196A75A4}" dt="2023-05-02T10:38:32.435" v="239" actId="14826"/>
+          <ac:picMkLst>
+            <pc:docMk/>
+            <pc:sldMk cId="3879652901" sldId="256"/>
+            <ac:picMk id="6" creationId="{410CC1BC-6523-BE74-2AD2-99EB70D0DB1E}"/>
+          </ac:picMkLst>
+        </pc:picChg>
+        <pc:picChg chg="mod">
+          <ac:chgData name="Snir Barzilay" userId="25ae7c42a3a23ea8" providerId="LiveId" clId="{31765B9D-4116-4D11-B2D1-2419196A75A4}" dt="2023-05-02T10:38:54.297" v="241" actId="14826"/>
+          <ac:picMkLst>
+            <pc:docMk/>
+            <pc:sldMk cId="3879652901" sldId="256"/>
+            <ac:picMk id="11" creationId="{DECC68EC-0E76-C00C-2DFA-77C32B3B1D90}"/>
+          </ac:picMkLst>
+        </pc:picChg>
+      </pc:sldChg>
+      <pc:sldChg chg="modSp mod">
+        <pc:chgData name="Snir Barzilay" userId="25ae7c42a3a23ea8" providerId="LiveId" clId="{31765B9D-4116-4D11-B2D1-2419196A75A4}" dt="2023-05-02T10:39:24.591" v="244" actId="14826"/>
+        <pc:sldMkLst>
+          <pc:docMk/>
+          <pc:sldMk cId="2433336688" sldId="257"/>
+        </pc:sldMkLst>
+        <pc:spChg chg="mod">
+          <ac:chgData name="Snir Barzilay" userId="25ae7c42a3a23ea8" providerId="LiveId" clId="{31765B9D-4116-4D11-B2D1-2419196A75A4}" dt="2023-05-02T10:06:21.793" v="71" actId="1076"/>
+          <ac:spMkLst>
+            <pc:docMk/>
+            <pc:sldMk cId="2433336688" sldId="257"/>
+            <ac:spMk id="2" creationId="{FE7764C1-95F5-6113-B236-79FEDA8D0EBE}"/>
+          </ac:spMkLst>
+        </pc:spChg>
+        <pc:spChg chg="mod">
+          <ac:chgData name="Snir Barzilay" userId="25ae7c42a3a23ea8" providerId="LiveId" clId="{31765B9D-4116-4D11-B2D1-2419196A75A4}" dt="2023-05-02T10:10:02.086" v="238" actId="14100"/>
+          <ac:spMkLst>
+            <pc:docMk/>
+            <pc:sldMk cId="2433336688" sldId="257"/>
+            <ac:spMk id="4" creationId="{14610072-524F-1463-E51C-B5606B4B245B}"/>
+          </ac:spMkLst>
+        </pc:spChg>
+        <pc:spChg chg="mod">
+          <ac:chgData name="Snir Barzilay" userId="25ae7c42a3a23ea8" providerId="LiveId" clId="{31765B9D-4116-4D11-B2D1-2419196A75A4}" dt="2023-05-02T10:08:42.657" v="172" actId="122"/>
+          <ac:spMkLst>
+            <pc:docMk/>
+            <pc:sldMk cId="2433336688" sldId="257"/>
+            <ac:spMk id="8" creationId="{461EB362-8CC4-3AD7-12D9-B0DEECDAD8D1}"/>
+          </ac:spMkLst>
+        </pc:spChg>
+        <pc:spChg chg="mod">
+          <ac:chgData name="Snir Barzilay" userId="25ae7c42a3a23ea8" providerId="LiveId" clId="{31765B9D-4116-4D11-B2D1-2419196A75A4}" dt="2023-05-02T10:08:46.989" v="175" actId="122"/>
+          <ac:spMkLst>
+            <pc:docMk/>
+            <pc:sldMk cId="2433336688" sldId="257"/>
+            <ac:spMk id="10" creationId="{AF5C1BCB-FD5D-F37C-7541-60C4998F365D}"/>
+          </ac:spMkLst>
+        </pc:spChg>
+        <pc:spChg chg="mod">
+          <ac:chgData name="Snir Barzilay" userId="25ae7c42a3a23ea8" providerId="LiveId" clId="{31765B9D-4116-4D11-B2D1-2419196A75A4}" dt="2023-05-02T10:08:08.629" v="83" actId="5793"/>
+          <ac:spMkLst>
+            <pc:docMk/>
+            <pc:sldMk cId="2433336688" sldId="257"/>
+            <ac:spMk id="15" creationId="{A70BA71A-A026-8B1C-1927-C10CFAECF46B}"/>
+          </ac:spMkLst>
+        </pc:spChg>
+        <pc:picChg chg="mod">
+          <ac:chgData name="Snir Barzilay" userId="25ae7c42a3a23ea8" providerId="LiveId" clId="{31765B9D-4116-4D11-B2D1-2419196A75A4}" dt="2023-05-02T10:39:07.395" v="242" actId="14826"/>
+          <ac:picMkLst>
+            <pc:docMk/>
+            <pc:sldMk cId="2433336688" sldId="257"/>
+            <ac:picMk id="6" creationId="{410CC1BC-6523-BE74-2AD2-99EB70D0DB1E}"/>
+          </ac:picMkLst>
+        </pc:picChg>
+        <pc:picChg chg="mod">
+          <ac:chgData name="Snir Barzilay" userId="25ae7c42a3a23ea8" providerId="LiveId" clId="{31765B9D-4116-4D11-B2D1-2419196A75A4}" dt="2023-05-02T10:39:24.591" v="244" actId="14826"/>
+          <ac:picMkLst>
+            <pc:docMk/>
+            <pc:sldMk cId="2433336688" sldId="257"/>
+            <ac:picMk id="7" creationId="{33AD3C0A-5FEE-4BEF-CAD5-E75FCFBBB65A}"/>
+          </ac:picMkLst>
+        </pc:picChg>
+      </pc:sldChg>
+    </pc:docChg>
+  </pc:docChgLst>
 </pc:chgInfo>
 </file>
 
@@ -816,7 +951,7 @@
           <a:p>
             <a:fld id="{FFB54A5F-3255-4218-9BCB-8C6EAB0F2463}" type="datetimeFigureOut">
               <a:rPr lang="en-US" smtClean="0"/>
-              <a:t>3/20/2023</a:t>
+              <a:t>5/2/2023</a:t>
             </a:fld>
             <a:endParaRPr lang="en-US"/>
           </a:p>
@@ -986,7 +1121,7 @@
           <a:p>
             <a:fld id="{FFB54A5F-3255-4218-9BCB-8C6EAB0F2463}" type="datetimeFigureOut">
               <a:rPr lang="en-US" smtClean="0"/>
-              <a:t>3/20/2023</a:t>
+              <a:t>5/2/2023</a:t>
             </a:fld>
             <a:endParaRPr lang="en-US"/>
           </a:p>
@@ -1166,7 +1301,7 @@
           <a:p>
             <a:fld id="{FFB54A5F-3255-4218-9BCB-8C6EAB0F2463}" type="datetimeFigureOut">
               <a:rPr lang="en-US" smtClean="0"/>
-              <a:t>3/20/2023</a:t>
+              <a:t>5/2/2023</a:t>
             </a:fld>
             <a:endParaRPr lang="en-US"/>
           </a:p>
@@ -1336,7 +1471,7 @@
           <a:p>
             <a:fld id="{FFB54A5F-3255-4218-9BCB-8C6EAB0F2463}" type="datetimeFigureOut">
               <a:rPr lang="en-US" smtClean="0"/>
-              <a:t>3/20/2023</a:t>
+              <a:t>5/2/2023</a:t>
             </a:fld>
             <a:endParaRPr lang="en-US"/>
           </a:p>
@@ -1580,7 +1715,7 @@
           <a:p>
             <a:fld id="{FFB54A5F-3255-4218-9BCB-8C6EAB0F2463}" type="datetimeFigureOut">
               <a:rPr lang="en-US" smtClean="0"/>
-              <a:t>3/20/2023</a:t>
+              <a:t>5/2/2023</a:t>
             </a:fld>
             <a:endParaRPr lang="en-US"/>
           </a:p>
@@ -1812,7 +1947,7 @@
           <a:p>
             <a:fld id="{FFB54A5F-3255-4218-9BCB-8C6EAB0F2463}" type="datetimeFigureOut">
               <a:rPr lang="en-US" smtClean="0"/>
-              <a:t>3/20/2023</a:t>
+              <a:t>5/2/2023</a:t>
             </a:fld>
             <a:endParaRPr lang="en-US"/>
           </a:p>
@@ -2179,7 +2314,7 @@
           <a:p>
             <a:fld id="{FFB54A5F-3255-4218-9BCB-8C6EAB0F2463}" type="datetimeFigureOut">
               <a:rPr lang="en-US" smtClean="0"/>
-              <a:t>3/20/2023</a:t>
+              <a:t>5/2/2023</a:t>
             </a:fld>
             <a:endParaRPr lang="en-US"/>
           </a:p>
@@ -2297,7 +2432,7 @@
           <a:p>
             <a:fld id="{FFB54A5F-3255-4218-9BCB-8C6EAB0F2463}" type="datetimeFigureOut">
               <a:rPr lang="en-US" smtClean="0"/>
-              <a:t>3/20/2023</a:t>
+              <a:t>5/2/2023</a:t>
             </a:fld>
             <a:endParaRPr lang="en-US"/>
           </a:p>
@@ -2392,7 +2527,7 @@
           <a:p>
             <a:fld id="{FFB54A5F-3255-4218-9BCB-8C6EAB0F2463}" type="datetimeFigureOut">
               <a:rPr lang="en-US" smtClean="0"/>
-              <a:t>3/20/2023</a:t>
+              <a:t>5/2/2023</a:t>
             </a:fld>
             <a:endParaRPr lang="en-US"/>
           </a:p>
@@ -2669,7 +2804,7 @@
           <a:p>
             <a:fld id="{FFB54A5F-3255-4218-9BCB-8C6EAB0F2463}" type="datetimeFigureOut">
               <a:rPr lang="en-US" smtClean="0"/>
-              <a:t>3/20/2023</a:t>
+              <a:t>5/2/2023</a:t>
             </a:fld>
             <a:endParaRPr lang="en-US"/>
           </a:p>
@@ -2926,7 +3061,7 @@
           <a:p>
             <a:fld id="{FFB54A5F-3255-4218-9BCB-8C6EAB0F2463}" type="datetimeFigureOut">
               <a:rPr lang="en-US" smtClean="0"/>
-              <a:t>3/20/2023</a:t>
+              <a:t>5/2/2023</a:t>
             </a:fld>
             <a:endParaRPr lang="en-US"/>
           </a:p>
@@ -3142,7 +3277,7 @@
           <a:p>
             <a:fld id="{FFB54A5F-3255-4218-9BCB-8C6EAB0F2463}" type="datetimeFigureOut">
               <a:rPr lang="en-US" smtClean="0"/>
-              <a:t>3/20/2023</a:t>
+              <a:t>5/2/2023</a:t>
             </a:fld>
             <a:endParaRPr lang="en-US"/>
           </a:p>
@@ -3575,14 +3710,14 @@
           </a:bodyPr>
           <a:lstStyle/>
           <a:p>
-            <a:pPr algn="r"/>
+            <a:pPr algn="ctr"/>
             <a:r>
               <a:rPr lang="he-IL" sz="1400" dirty="0"/>
               <a:t>במטלה הבאה יהיה עליך ללמוד את הערך המספרי בשקלים של שני צדדי מטבע.</a:t>
             </a:r>
           </a:p>
           <a:p>
-            <a:pPr algn="r"/>
+            <a:pPr algn="ctr"/>
             <a:r>
               <a:rPr lang="he-IL" sz="1400" dirty="0"/>
               <a:t>לפני כל צעד ניסוי יופיעו שני צדדי מטבע. לדוגמה: </a:t>
@@ -3616,7 +3751,7 @@
       </p:sp>
       <p:pic>
         <p:nvPicPr>
-          <p:cNvPr id="3" name="Picture 2" descr="A green frog on a white plate&#10;&#10;Description automatically generated">
+          <p:cNvPr id="3" name="Picture 2">
             <a:extLst>
               <a:ext uri="{FF2B5EF4-FFF2-40B4-BE49-F238E27FC236}">
                 <a16:creationId xmlns:a16="http://schemas.microsoft.com/office/drawing/2014/main" id="{642C228D-8C30-8564-3D78-6B9C312AEB6B}"/>
@@ -3636,9 +3771,8 @@
               </a:ext>
             </a:extLst>
           </a:blip>
-          <a:stretch>
-            <a:fillRect/>
-          </a:stretch>
+          <a:srcRect/>
+          <a:stretch/>
         </p:blipFill>
         <p:spPr>
           <a:xfrm>
@@ -3652,7 +3786,7 @@
       </p:pic>
       <p:pic>
         <p:nvPicPr>
-          <p:cNvPr id="6" name="Picture 5" descr="A close-up of a person&#10;&#10;Description automatically generated with low confidence">
+          <p:cNvPr id="6" name="Picture 5">
             <a:extLst>
               <a:ext uri="{FF2B5EF4-FFF2-40B4-BE49-F238E27FC236}">
                 <a16:creationId xmlns:a16="http://schemas.microsoft.com/office/drawing/2014/main" id="{410CC1BC-6523-BE74-2AD2-99EB70D0DB1E}"/>
@@ -3672,9 +3806,8 @@
               </a:ext>
             </a:extLst>
           </a:blip>
-          <a:stretch>
-            <a:fillRect/>
-          </a:stretch>
+          <a:srcRect/>
+          <a:stretch/>
         </p:blipFill>
         <p:spPr>
           <a:xfrm>
@@ -3714,7 +3847,7 @@
           </a:bodyPr>
           <a:lstStyle/>
           <a:p>
-            <a:pPr algn="r"/>
+            <a:pPr algn="ctr"/>
             <a:r>
               <a:rPr lang="he-IL" sz="1400" dirty="0"/>
               <a:t>לאחר לחיצה על מקש הרווח, המטבע יוגרל וייפול על אחד מצדדיו. מיד לאחר מכן, יופיע מספר שיתאר את התוצאה של אותה הטלת מטבע:</a:t>
@@ -3736,7 +3869,7 @@
         </p:nvSpPr>
         <p:spPr>
           <a:xfrm>
-            <a:off x="3471025" y="4973583"/>
+            <a:off x="2400940" y="5028752"/>
             <a:ext cx="4572000" cy="307777"/>
           </a:xfrm>
           <a:prstGeom prst="rect">
@@ -3750,7 +3883,7 @@
           </a:bodyPr>
           <a:lstStyle/>
           <a:p>
-            <a:pPr algn="r"/>
+            <a:pPr algn="ctr"/>
             <a:r>
               <a:rPr lang="he-IL" sz="1400" dirty="0"/>
               <a:t>עליך ללמוד אילו ערכים מקושרים לצדדים השונים של המטבע. </a:t>
@@ -3760,7 +3893,7 @@
       </p:sp>
       <p:pic>
         <p:nvPicPr>
-          <p:cNvPr id="11" name="Picture 10" descr="A green frog on a white plate&#10;&#10;Description automatically generated">
+          <p:cNvPr id="11" name="Picture 10">
             <a:extLst>
               <a:ext uri="{FF2B5EF4-FFF2-40B4-BE49-F238E27FC236}">
                 <a16:creationId xmlns:a16="http://schemas.microsoft.com/office/drawing/2014/main" id="{DECC68EC-0E76-C00C-2DFA-77C32B3B1D90}"/>
@@ -3773,16 +3906,15 @@
           <p:nvPr/>
         </p:nvPicPr>
         <p:blipFill>
-          <a:blip r:embed="rId2">
+          <a:blip r:embed="rId4">
             <a:extLst>
               <a:ext uri="{28A0092B-C50C-407E-A947-70E740481C1C}">
                 <a14:useLocalDpi xmlns:a14="http://schemas.microsoft.com/office/drawing/2010/main" val="0"/>
               </a:ext>
             </a:extLst>
           </a:blip>
-          <a:stretch>
-            <a:fillRect/>
-          </a:stretch>
+          <a:srcRect/>
+          <a:stretch/>
         </p:blipFill>
         <p:spPr>
           <a:xfrm>
@@ -3852,8 +3984,8 @@
         </p:nvSpPr>
         <p:spPr>
           <a:xfrm>
-            <a:off x="3386919" y="4007634"/>
-            <a:ext cx="740980" cy="369332"/>
+            <a:off x="3462586" y="3981358"/>
+            <a:ext cx="291646" cy="646331"/>
           </a:xfrm>
           <a:prstGeom prst="rect">
             <a:avLst/>
@@ -3867,9 +3999,10 @@
           <a:lstStyle/>
           <a:p>
             <a:r>
-              <a:rPr lang="en-US" dirty="0"/>
-              <a:t>-5</a:t>
-            </a:r>
+              <a:rPr lang="he-IL" dirty="0"/>
+              <a:t>₪ </a:t>
+            </a:r>
+            <a:endParaRPr lang="en-US" dirty="0"/>
           </a:p>
         </p:txBody>
       </p:sp>
@@ -3917,7 +4050,7 @@
         </p:nvSpPr>
         <p:spPr>
           <a:xfrm>
-            <a:off x="2832538" y="1234967"/>
+            <a:off x="2828016" y="1533719"/>
             <a:ext cx="1560786" cy="1598074"/>
           </a:xfrm>
           <a:prstGeom prst="ellipse">
@@ -3969,8 +4102,8 @@
         </p:nvSpPr>
         <p:spPr>
           <a:xfrm>
-            <a:off x="1330856" y="614225"/>
-            <a:ext cx="6712169" cy="1831271"/>
+            <a:off x="1016901" y="451595"/>
+            <a:ext cx="6844846" cy="2200602"/>
           </a:xfrm>
           <a:prstGeom prst="rect">
             <a:avLst/>
@@ -3983,45 +4116,53 @@
           </a:bodyPr>
           <a:lstStyle/>
           <a:p>
-            <a:pPr algn="r"/>
+            <a:pPr algn="ctr" rtl="1"/>
             <a:r>
               <a:rPr lang="he-IL" sz="1400" b="1" dirty="0"/>
               <a:t>בחלק מהצעדים</a:t>
             </a:r>
             <a:r>
               <a:rPr lang="he-IL" sz="1400" dirty="0"/>
-              <a:t>, יופיע עיגול ירוק מסביב לאחד מצדדי המטבע. בצעדים אלו, יהיה עליך לדמיין את המטבע מסתובב ונוחת על הצד המסומן בירוק</a:t>
-            </a:r>
-          </a:p>
-          <a:p>
-            <a:pPr algn="r"/>
+              <a:t>, יופיע עיגול ירוק מסביב לאחד מצדדי המטבע. לאחר לחיצה על מקש הרווח, יופיע מטבע אפור מסתובב ששני צדדיו ריקים. בזמן הסיבוב נבקש ממך לדמיין את הצורות מתחלפות על המטבע הריק. יהיה עליך לדמיין את המטבע מסתובב ונוחת על הצד המסומן בירוק.</a:t>
+            </a:r>
+            <a:r>
+              <a:rPr lang="en-US" sz="1400" dirty="0"/>
+              <a:t> </a:t>
+            </a:r>
+            <a:r>
+              <a:rPr lang="he-IL" sz="1400" dirty="0"/>
+              <a:t>בזמן הסיבוב, כשמטבע הריק ייעצר, יהיה עליך לדמיין שהמטבע נחת על הצורה שמסומנת בירוק.</a:t>
+            </a:r>
+          </a:p>
+          <a:p>
+            <a:pPr algn="r" rtl="1"/>
             <a:endParaRPr lang="he-IL" sz="1350" dirty="0"/>
           </a:p>
           <a:p>
-            <a:pPr algn="r"/>
+            <a:pPr algn="r" rtl="1"/>
             <a:endParaRPr lang="he-IL" sz="1350" dirty="0"/>
           </a:p>
           <a:p>
-            <a:pPr algn="r"/>
+            <a:pPr algn="r" rtl="1"/>
             <a:endParaRPr lang="he-IL" sz="1350" dirty="0"/>
           </a:p>
           <a:p>
-            <a:pPr algn="r"/>
+            <a:pPr algn="r" rtl="1"/>
             <a:endParaRPr lang="he-IL" sz="1350" dirty="0"/>
           </a:p>
           <a:p>
-            <a:pPr algn="r"/>
+            <a:pPr algn="r" rtl="1"/>
             <a:endParaRPr lang="he-IL" sz="1350" dirty="0"/>
           </a:p>
           <a:p>
-            <a:pPr algn="r"/>
+            <a:pPr algn="r" rtl="1"/>
             <a:endParaRPr lang="he-IL" sz="1350" dirty="0"/>
           </a:p>
         </p:txBody>
       </p:sp>
       <p:pic>
         <p:nvPicPr>
-          <p:cNvPr id="6" name="Picture 5" descr="A close-up of a person&#10;&#10;Description automatically generated with low confidence">
+          <p:cNvPr id="6" name="Picture 5">
             <a:extLst>
               <a:ext uri="{FF2B5EF4-FFF2-40B4-BE49-F238E27FC236}">
                 <a16:creationId xmlns:a16="http://schemas.microsoft.com/office/drawing/2014/main" id="{410CC1BC-6523-BE74-2AD2-99EB70D0DB1E}"/>
@@ -4041,13 +4182,12 @@
               </a:ext>
             </a:extLst>
           </a:blip>
-          <a:stretch>
-            <a:fillRect/>
-          </a:stretch>
+          <a:srcRect/>
+          <a:stretch/>
         </p:blipFill>
         <p:spPr>
           <a:xfrm>
-            <a:off x="5535591" y="1390970"/>
+            <a:off x="5535591" y="1711797"/>
             <a:ext cx="1253165" cy="1253165"/>
           </a:xfrm>
           <a:prstGeom prst="rect">
@@ -4069,8 +4209,8 @@
         </p:nvSpPr>
         <p:spPr>
           <a:xfrm>
-            <a:off x="1198180" y="2903186"/>
-            <a:ext cx="6844846" cy="738664"/>
+            <a:off x="1149577" y="3257128"/>
+            <a:ext cx="6844846" cy="307777"/>
           </a:xfrm>
           <a:prstGeom prst="rect">
             <a:avLst/>
@@ -4083,10 +4223,10 @@
           </a:bodyPr>
           <a:lstStyle/>
           <a:p>
-            <a:pPr algn="r"/>
+            <a:pPr algn="ctr"/>
             <a:r>
               <a:rPr lang="he-IL" sz="1400" dirty="0"/>
-              <a:t>לאחר לחיצה על מקש הרווח, יופיע מטבע מסתובב ששני צדדיו ריקים. בזמן הסיבוב, נבקש ממך לדמיין את הצורות מתחלפות. כשמטבע הריק ייעצר, יהיה עליך לדמיין את הצורה שמסומנת בירוק. מיד לאחר מכן, יופיע מספר שיתאר את התוצאה של אותה הטלת מטבע:</a:t>
+              <a:t>מיד לאחר מכן, יופיע מספר שיתאר את התוצאה של אותה הטלת מטבע:</a:t>
             </a:r>
           </a:p>
         </p:txBody>
@@ -4105,8 +4245,8 @@
         </p:nvSpPr>
         <p:spPr>
           <a:xfrm>
-            <a:off x="3471025" y="4973583"/>
-            <a:ext cx="4572000" cy="523220"/>
+            <a:off x="1266497" y="4973583"/>
+            <a:ext cx="6776528" cy="523220"/>
           </a:xfrm>
           <a:prstGeom prst="rect">
             <a:avLst/>
@@ -4119,10 +4259,17 @@
           </a:bodyPr>
           <a:lstStyle/>
           <a:p>
-            <a:pPr algn="r"/>
+            <a:pPr algn="ctr"/>
             <a:r>
               <a:rPr lang="he-IL" sz="1400" dirty="0"/>
               <a:t>גם כאן יהיה עליך ללמוד אילו ערכים מקושרים לצדדים השונים של המטבע. </a:t>
+            </a:r>
+          </a:p>
+          <a:p>
+            <a:pPr algn="ctr"/>
+            <a:r>
+              <a:rPr lang="he-IL" sz="1400" dirty="0"/>
+              <a:t>ייתכן והערכים של צעדי הדמיון והערכים של צעדי הצפייה יהיו שונים. </a:t>
             </a:r>
           </a:p>
         </p:txBody>
@@ -4185,8 +4332,8 @@
         </p:nvSpPr>
         <p:spPr>
           <a:xfrm>
-            <a:off x="3386919" y="4007634"/>
-            <a:ext cx="740980" cy="369332"/>
+            <a:off x="3352185" y="4012427"/>
+            <a:ext cx="583939" cy="369332"/>
           </a:xfrm>
           <a:prstGeom prst="rect">
             <a:avLst/>
@@ -4200,15 +4347,16 @@
           <a:lstStyle/>
           <a:p>
             <a:r>
-              <a:rPr lang="en-US" dirty="0"/>
-              <a:t>-8</a:t>
-            </a:r>
+              <a:rPr lang="he-IL" dirty="0"/>
+              <a:t>₪ </a:t>
+            </a:r>
+            <a:endParaRPr lang="en-US" dirty="0"/>
           </a:p>
         </p:txBody>
       </p:sp>
       <p:pic>
         <p:nvPicPr>
-          <p:cNvPr id="7" name="Picture 6" descr="A green frog on a black plate&#10;&#10;Description automatically generated with medium confidence">
+          <p:cNvPr id="7" name="Picture 6">
             <a:extLst>
               <a:ext uri="{FF2B5EF4-FFF2-40B4-BE49-F238E27FC236}">
                 <a16:creationId xmlns:a16="http://schemas.microsoft.com/office/drawing/2014/main" id="{33AD3C0A-5FEE-4BEF-CAD5-E75FCFBBB65A}"/>
@@ -4228,13 +4376,12 @@
               </a:ext>
             </a:extLst>
           </a:blip>
-          <a:stretch>
-            <a:fillRect/>
-          </a:stretch>
+          <a:srcRect/>
+          <a:stretch/>
         </p:blipFill>
         <p:spPr>
           <a:xfrm>
-            <a:off x="2940518" y="1366993"/>
+            <a:off x="2936831" y="1659756"/>
             <a:ext cx="1343157" cy="1343157"/>
           </a:xfrm>
           <a:prstGeom prst="rect">

</xml_diff>

<commit_message>
Made the coin spin slower, added instructions before the gambling phase and increased the training trials length to 24
</commit_message>
<xml_diff>
--- a/instructions.pptx
+++ b/instructions.pptx
@@ -7,6 +7,7 @@
   <p:sldIdLst>
     <p:sldId id="256" r:id="rId2"/>
     <p:sldId id="257" r:id="rId3"/>
+    <p:sldId id="258" r:id="rId4"/>
   </p:sldIdLst>
   <p:sldSz cx="9144000" cy="6858000" type="screen4x3"/>
   <p:notesSz cx="6858000" cy="9144000"/>
@@ -116,7 +117,7 @@
 <file path=ppt/revisionInfo.xml><?xml version="1.0" encoding="utf-8"?>
 <p1510:revInfo xmlns:a="http://schemas.openxmlformats.org/drawingml/2006/main" xmlns:r="http://schemas.openxmlformats.org/officeDocument/2006/relationships" xmlns:p1510="http://schemas.microsoft.com/office/powerpoint/2015/10/main">
   <p1510:revLst>
-    <p1510:client id="{31765B9D-4116-4D11-B2D1-2419196A75A4}" v="6" dt="2023-05-02T10:39:24.602"/>
+    <p1510:client id="{31765B9D-4116-4D11-B2D1-2419196A75A4}" v="10" dt="2023-05-14T03:43:30.597"/>
   </p1510:revLst>
 </p1510:revInfo>
 </file>
@@ -684,8 +685,8 @@
   </pc:docChgLst>
   <pc:docChgLst>
     <pc:chgData name="Snir Barzilay" userId="25ae7c42a3a23ea8" providerId="LiveId" clId="{31765B9D-4116-4D11-B2D1-2419196A75A4}"/>
-    <pc:docChg chg="undo custSel modSld">
-      <pc:chgData name="Snir Barzilay" userId="25ae7c42a3a23ea8" providerId="LiveId" clId="{31765B9D-4116-4D11-B2D1-2419196A75A4}" dt="2023-05-02T10:39:24.591" v="244" actId="14826"/>
+    <pc:docChg chg="undo custSel addSld modSld">
+      <pc:chgData name="Snir Barzilay" userId="25ae7c42a3a23ea8" providerId="LiveId" clId="{31765B9D-4116-4D11-B2D1-2419196A75A4}" dt="2023-05-14T03:49:16.838" v="982" actId="20577"/>
       <pc:docMkLst>
         <pc:docMk/>
       </pc:docMkLst>
@@ -753,7 +754,7 @@
         </pc:picChg>
       </pc:sldChg>
       <pc:sldChg chg="modSp mod">
-        <pc:chgData name="Snir Barzilay" userId="25ae7c42a3a23ea8" providerId="LiveId" clId="{31765B9D-4116-4D11-B2D1-2419196A75A4}" dt="2023-05-02T10:39:24.591" v="244" actId="14826"/>
+        <pc:chgData name="Snir Barzilay" userId="25ae7c42a3a23ea8" providerId="LiveId" clId="{31765B9D-4116-4D11-B2D1-2419196A75A4}" dt="2023-05-14T03:39:44.025" v="396" actId="20577"/>
         <pc:sldMkLst>
           <pc:docMk/>
           <pc:sldMk cId="2433336688" sldId="257"/>
@@ -783,7 +784,7 @@
           </ac:spMkLst>
         </pc:spChg>
         <pc:spChg chg="mod">
-          <ac:chgData name="Snir Barzilay" userId="25ae7c42a3a23ea8" providerId="LiveId" clId="{31765B9D-4116-4D11-B2D1-2419196A75A4}" dt="2023-05-02T10:08:46.989" v="175" actId="122"/>
+          <ac:chgData name="Snir Barzilay" userId="25ae7c42a3a23ea8" providerId="LiveId" clId="{31765B9D-4116-4D11-B2D1-2419196A75A4}" dt="2023-05-14T03:39:44.025" v="396" actId="20577"/>
           <ac:spMkLst>
             <pc:docMk/>
             <pc:sldMk cId="2433336688" sldId="257"/>
@@ -812,6 +813,77 @@
             <pc:docMk/>
             <pc:sldMk cId="2433336688" sldId="257"/>
             <ac:picMk id="7" creationId="{33AD3C0A-5FEE-4BEF-CAD5-E75FCFBBB65A}"/>
+          </ac:picMkLst>
+        </pc:picChg>
+      </pc:sldChg>
+      <pc:sldChg chg="addSp delSp modSp new mod">
+        <pc:chgData name="Snir Barzilay" userId="25ae7c42a3a23ea8" providerId="LiveId" clId="{31765B9D-4116-4D11-B2D1-2419196A75A4}" dt="2023-05-14T03:49:16.838" v="982" actId="20577"/>
+        <pc:sldMkLst>
+          <pc:docMk/>
+          <pc:sldMk cId="1907122730" sldId="258"/>
+        </pc:sldMkLst>
+        <pc:spChg chg="del">
+          <ac:chgData name="Snir Barzilay" userId="25ae7c42a3a23ea8" providerId="LiveId" clId="{31765B9D-4116-4D11-B2D1-2419196A75A4}" dt="2023-05-14T03:40:02.724" v="398" actId="478"/>
+          <ac:spMkLst>
+            <pc:docMk/>
+            <pc:sldMk cId="1907122730" sldId="258"/>
+            <ac:spMk id="2" creationId="{72A3B1E3-F77C-3EF8-C357-4627ABDAC3FE}"/>
+          </ac:spMkLst>
+        </pc:spChg>
+        <pc:spChg chg="del">
+          <ac:chgData name="Snir Barzilay" userId="25ae7c42a3a23ea8" providerId="LiveId" clId="{31765B9D-4116-4D11-B2D1-2419196A75A4}" dt="2023-05-14T03:40:04.044" v="399" actId="478"/>
+          <ac:spMkLst>
+            <pc:docMk/>
+            <pc:sldMk cId="1907122730" sldId="258"/>
+            <ac:spMk id="3" creationId="{66E75FA3-0FE3-6C89-17DC-D359EFAEB03E}"/>
+          </ac:spMkLst>
+        </pc:spChg>
+        <pc:spChg chg="add mod">
+          <ac:chgData name="Snir Barzilay" userId="25ae7c42a3a23ea8" providerId="LiveId" clId="{31765B9D-4116-4D11-B2D1-2419196A75A4}" dt="2023-05-14T03:41:06.813" v="561" actId="20577"/>
+          <ac:spMkLst>
+            <pc:docMk/>
+            <pc:sldMk cId="1907122730" sldId="258"/>
+            <ac:spMk id="4" creationId="{F106ABA8-DF0F-9F04-30C5-8673A25B41C1}"/>
+          </ac:spMkLst>
+        </pc:spChg>
+        <pc:spChg chg="add mod">
+          <ac:chgData name="Snir Barzilay" userId="25ae7c42a3a23ea8" providerId="LiveId" clId="{31765B9D-4116-4D11-B2D1-2419196A75A4}" dt="2023-05-14T03:42:57.379" v="586" actId="1076"/>
+          <ac:spMkLst>
+            <pc:docMk/>
+            <pc:sldMk cId="1907122730" sldId="258"/>
+            <ac:spMk id="7" creationId="{C95F0CDA-78B3-FE21-F423-F7C3BA262E22}"/>
+          </ac:spMkLst>
+        </pc:spChg>
+        <pc:spChg chg="add mod">
+          <ac:chgData name="Snir Barzilay" userId="25ae7c42a3a23ea8" providerId="LiveId" clId="{31765B9D-4116-4D11-B2D1-2419196A75A4}" dt="2023-05-14T03:43:19.084" v="595" actId="1076"/>
+          <ac:spMkLst>
+            <pc:docMk/>
+            <pc:sldMk cId="1907122730" sldId="258"/>
+            <ac:spMk id="9" creationId="{71CD924D-088C-EC79-8BE2-7FC35888E685}"/>
+          </ac:spMkLst>
+        </pc:spChg>
+        <pc:spChg chg="add mod">
+          <ac:chgData name="Snir Barzilay" userId="25ae7c42a3a23ea8" providerId="LiveId" clId="{31765B9D-4116-4D11-B2D1-2419196A75A4}" dt="2023-05-14T03:49:16.838" v="982" actId="20577"/>
+          <ac:spMkLst>
+            <pc:docMk/>
+            <pc:sldMk cId="1907122730" sldId="258"/>
+            <ac:spMk id="10" creationId="{FD544692-7B7A-EFF9-F613-BD7396EF4B4A}"/>
+          </ac:spMkLst>
+        </pc:spChg>
+        <pc:picChg chg="add mod">
+          <ac:chgData name="Snir Barzilay" userId="25ae7c42a3a23ea8" providerId="LiveId" clId="{31765B9D-4116-4D11-B2D1-2419196A75A4}" dt="2023-05-14T03:43:05.075" v="588" actId="1076"/>
+          <ac:picMkLst>
+            <pc:docMk/>
+            <pc:sldMk cId="1907122730" sldId="258"/>
+            <ac:picMk id="5" creationId="{BE16D9BB-716E-C280-2AD0-35ED6286F80A}"/>
+          </ac:picMkLst>
+        </pc:picChg>
+        <pc:picChg chg="add mod">
+          <ac:chgData name="Snir Barzilay" userId="25ae7c42a3a23ea8" providerId="LiveId" clId="{31765B9D-4116-4D11-B2D1-2419196A75A4}" dt="2023-05-14T03:41:31.191" v="567" actId="1076"/>
+          <ac:picMkLst>
+            <pc:docMk/>
+            <pc:sldMk cId="1907122730" sldId="258"/>
+            <ac:picMk id="6" creationId="{BE922488-182D-DA8C-0FCA-25244D06DC2E}"/>
           </ac:picMkLst>
         </pc:picChg>
       </pc:sldChg>
@@ -951,7 +1023,7 @@
           <a:p>
             <a:fld id="{FFB54A5F-3255-4218-9BCB-8C6EAB0F2463}" type="datetimeFigureOut">
               <a:rPr lang="en-US" smtClean="0"/>
-              <a:t>5/2/2023</a:t>
+              <a:t>5/14/2023</a:t>
             </a:fld>
             <a:endParaRPr lang="en-US"/>
           </a:p>
@@ -1121,7 +1193,7 @@
           <a:p>
             <a:fld id="{FFB54A5F-3255-4218-9BCB-8C6EAB0F2463}" type="datetimeFigureOut">
               <a:rPr lang="en-US" smtClean="0"/>
-              <a:t>5/2/2023</a:t>
+              <a:t>5/14/2023</a:t>
             </a:fld>
             <a:endParaRPr lang="en-US"/>
           </a:p>
@@ -1301,7 +1373,7 @@
           <a:p>
             <a:fld id="{FFB54A5F-3255-4218-9BCB-8C6EAB0F2463}" type="datetimeFigureOut">
               <a:rPr lang="en-US" smtClean="0"/>
-              <a:t>5/2/2023</a:t>
+              <a:t>5/14/2023</a:t>
             </a:fld>
             <a:endParaRPr lang="en-US"/>
           </a:p>
@@ -1471,7 +1543,7 @@
           <a:p>
             <a:fld id="{FFB54A5F-3255-4218-9BCB-8C6EAB0F2463}" type="datetimeFigureOut">
               <a:rPr lang="en-US" smtClean="0"/>
-              <a:t>5/2/2023</a:t>
+              <a:t>5/14/2023</a:t>
             </a:fld>
             <a:endParaRPr lang="en-US"/>
           </a:p>
@@ -1715,7 +1787,7 @@
           <a:p>
             <a:fld id="{FFB54A5F-3255-4218-9BCB-8C6EAB0F2463}" type="datetimeFigureOut">
               <a:rPr lang="en-US" smtClean="0"/>
-              <a:t>5/2/2023</a:t>
+              <a:t>5/14/2023</a:t>
             </a:fld>
             <a:endParaRPr lang="en-US"/>
           </a:p>
@@ -1947,7 +2019,7 @@
           <a:p>
             <a:fld id="{FFB54A5F-3255-4218-9BCB-8C6EAB0F2463}" type="datetimeFigureOut">
               <a:rPr lang="en-US" smtClean="0"/>
-              <a:t>5/2/2023</a:t>
+              <a:t>5/14/2023</a:t>
             </a:fld>
             <a:endParaRPr lang="en-US"/>
           </a:p>
@@ -2314,7 +2386,7 @@
           <a:p>
             <a:fld id="{FFB54A5F-3255-4218-9BCB-8C6EAB0F2463}" type="datetimeFigureOut">
               <a:rPr lang="en-US" smtClean="0"/>
-              <a:t>5/2/2023</a:t>
+              <a:t>5/14/2023</a:t>
             </a:fld>
             <a:endParaRPr lang="en-US"/>
           </a:p>
@@ -2432,7 +2504,7 @@
           <a:p>
             <a:fld id="{FFB54A5F-3255-4218-9BCB-8C6EAB0F2463}" type="datetimeFigureOut">
               <a:rPr lang="en-US" smtClean="0"/>
-              <a:t>5/2/2023</a:t>
+              <a:t>5/14/2023</a:t>
             </a:fld>
             <a:endParaRPr lang="en-US"/>
           </a:p>
@@ -2527,7 +2599,7 @@
           <a:p>
             <a:fld id="{FFB54A5F-3255-4218-9BCB-8C6EAB0F2463}" type="datetimeFigureOut">
               <a:rPr lang="en-US" smtClean="0"/>
-              <a:t>5/2/2023</a:t>
+              <a:t>5/14/2023</a:t>
             </a:fld>
             <a:endParaRPr lang="en-US"/>
           </a:p>
@@ -2804,7 +2876,7 @@
           <a:p>
             <a:fld id="{FFB54A5F-3255-4218-9BCB-8C6EAB0F2463}" type="datetimeFigureOut">
               <a:rPr lang="en-US" smtClean="0"/>
-              <a:t>5/2/2023</a:t>
+              <a:t>5/14/2023</a:t>
             </a:fld>
             <a:endParaRPr lang="en-US"/>
           </a:p>
@@ -3061,7 +3133,7 @@
           <a:p>
             <a:fld id="{FFB54A5F-3255-4218-9BCB-8C6EAB0F2463}" type="datetimeFigureOut">
               <a:rPr lang="en-US" smtClean="0"/>
-              <a:t>5/2/2023</a:t>
+              <a:t>5/14/2023</a:t>
             </a:fld>
             <a:endParaRPr lang="en-US"/>
           </a:p>
@@ -3277,7 +3349,7 @@
           <a:p>
             <a:fld id="{FFB54A5F-3255-4218-9BCB-8C6EAB0F2463}" type="datetimeFigureOut">
               <a:rPr lang="en-US" smtClean="0"/>
-              <a:t>5/2/2023</a:t>
+              <a:t>5/14/2023</a:t>
             </a:fld>
             <a:endParaRPr lang="en-US"/>
           </a:p>
@@ -4246,7 +4318,7 @@
         <p:spPr>
           <a:xfrm>
             <a:off x="1266497" y="4973583"/>
-            <a:ext cx="6776528" cy="523220"/>
+            <a:ext cx="6776528" cy="954107"/>
           </a:xfrm>
           <a:prstGeom prst="rect">
             <a:avLst/>
@@ -4270,6 +4342,18 @@
             <a:r>
               <a:rPr lang="he-IL" sz="1400" dirty="0"/>
               <a:t>ייתכן והערכים של צעדי הדמיון והערכים של צעדי הצפייה יהיו שונים. </a:t>
+            </a:r>
+            <a:endParaRPr lang="en-US" sz="1400" dirty="0"/>
+          </a:p>
+          <a:p>
+            <a:pPr algn="ctr"/>
+            <a:endParaRPr lang="he-IL" sz="1400" dirty="0"/>
+          </a:p>
+          <a:p>
+            <a:pPr algn="ctr"/>
+            <a:r>
+              <a:rPr lang="he-IL" sz="1400" dirty="0"/>
+              <a:t>השקעה בשלב הלמידה יכולה להגביר את הסיכוי לזכות בבונות גבוה יותר!</a:t>
             </a:r>
           </a:p>
         </p:txBody>
@@ -4429,6 +4513,338 @@
     <p:extLst>
       <p:ext uri="{BB962C8B-B14F-4D97-AF65-F5344CB8AC3E}">
         <p14:creationId xmlns:p14="http://schemas.microsoft.com/office/powerpoint/2010/main" val="2433336688"/>
+      </p:ext>
+    </p:extLst>
+  </p:cSld>
+  <p:clrMapOvr>
+    <a:masterClrMapping/>
+  </p:clrMapOvr>
+</p:sld>
+</file>
+
+<file path=ppt/slides/slide3.xml><?xml version="1.0" encoding="utf-8"?>
+<p:sld xmlns:a="http://schemas.openxmlformats.org/drawingml/2006/main" xmlns:r="http://schemas.openxmlformats.org/officeDocument/2006/relationships" xmlns:p="http://schemas.openxmlformats.org/presentationml/2006/main">
+  <p:cSld>
+    <p:spTree>
+      <p:nvGrpSpPr>
+        <p:cNvPr id="1" name=""/>
+        <p:cNvGrpSpPr/>
+        <p:nvPr/>
+      </p:nvGrpSpPr>
+      <p:grpSpPr>
+        <a:xfrm>
+          <a:off x="0" y="0"/>
+          <a:ext cx="0" cy="0"/>
+          <a:chOff x="0" y="0"/>
+          <a:chExt cx="0" cy="0"/>
+        </a:xfrm>
+      </p:grpSpPr>
+      <p:sp>
+        <p:nvSpPr>
+          <p:cNvPr id="4" name="TextBox 3">
+            <a:extLst>
+              <a:ext uri="{FF2B5EF4-FFF2-40B4-BE49-F238E27FC236}">
+                <a16:creationId xmlns:a16="http://schemas.microsoft.com/office/drawing/2014/main" id="{F106ABA8-DF0F-9F04-30C5-8673A25B41C1}"/>
+              </a:ext>
+            </a:extLst>
+          </p:cNvPr>
+          <p:cNvSpPr txBox="1"/>
+          <p:nvPr/>
+        </p:nvSpPr>
+        <p:spPr>
+          <a:xfrm>
+            <a:off x="1434662" y="609600"/>
+            <a:ext cx="6516414" cy="923330"/>
+          </a:xfrm>
+          <a:prstGeom prst="rect">
+            <a:avLst/>
+          </a:prstGeom>
+          <a:noFill/>
+        </p:spPr>
+        <p:txBody>
+          <a:bodyPr wrap="square" rtlCol="0">
+            <a:spAutoFit/>
+          </a:bodyPr>
+          <a:lstStyle/>
+          <a:p>
+            <a:pPr algn="r"/>
+            <a:r>
+              <a:rPr lang="he-IL" dirty="0"/>
+              <a:t>כעת יחל שלב ההימורים.</a:t>
+            </a:r>
+          </a:p>
+          <a:p>
+            <a:pPr algn="r"/>
+            <a:endParaRPr lang="he-IL" dirty="0"/>
+          </a:p>
+          <a:p>
+            <a:pPr algn="r"/>
+            <a:r>
+              <a:rPr lang="he-IL" dirty="0"/>
+              <a:t>בחלק זה, יופיעו בפניך שתי אפשרויות:</a:t>
+            </a:r>
+          </a:p>
+        </p:txBody>
+      </p:sp>
+      <p:pic>
+        <p:nvPicPr>
+          <p:cNvPr id="5" name="Picture 4">
+            <a:extLst>
+              <a:ext uri="{FF2B5EF4-FFF2-40B4-BE49-F238E27FC236}">
+                <a16:creationId xmlns:a16="http://schemas.microsoft.com/office/drawing/2014/main" id="{BE16D9BB-716E-C280-2AD0-35ED6286F80A}"/>
+              </a:ext>
+            </a:extLst>
+          </p:cNvPr>
+          <p:cNvPicPr>
+            <a:picLocks noChangeAspect="1"/>
+          </p:cNvPicPr>
+          <p:nvPr/>
+        </p:nvPicPr>
+        <p:blipFill>
+          <a:blip r:embed="rId2">
+            <a:extLst>
+              <a:ext uri="{28A0092B-C50C-407E-A947-70E740481C1C}">
+                <a14:useLocalDpi xmlns:a14="http://schemas.microsoft.com/office/drawing/2010/main" val="0"/>
+              </a:ext>
+            </a:extLst>
+          </a:blip>
+          <a:srcRect/>
+          <a:stretch/>
+        </p:blipFill>
+        <p:spPr>
+          <a:xfrm>
+            <a:off x="2414268" y="1937506"/>
+            <a:ext cx="721609" cy="721609"/>
+          </a:xfrm>
+          <a:prstGeom prst="rect">
+            <a:avLst/>
+          </a:prstGeom>
+        </p:spPr>
+      </p:pic>
+      <p:pic>
+        <p:nvPicPr>
+          <p:cNvPr id="6" name="Picture 5">
+            <a:extLst>
+              <a:ext uri="{FF2B5EF4-FFF2-40B4-BE49-F238E27FC236}">
+                <a16:creationId xmlns:a16="http://schemas.microsoft.com/office/drawing/2014/main" id="{BE922488-182D-DA8C-0FCA-25244D06DC2E}"/>
+              </a:ext>
+            </a:extLst>
+          </p:cNvPr>
+          <p:cNvPicPr>
+            <a:picLocks noChangeAspect="1"/>
+          </p:cNvPicPr>
+          <p:nvPr/>
+        </p:nvPicPr>
+        <p:blipFill>
+          <a:blip r:embed="rId3">
+            <a:extLst>
+              <a:ext uri="{28A0092B-C50C-407E-A947-70E740481C1C}">
+                <a14:useLocalDpi xmlns:a14="http://schemas.microsoft.com/office/drawing/2010/main" val="0"/>
+              </a:ext>
+            </a:extLst>
+          </a:blip>
+          <a:srcRect/>
+          <a:stretch/>
+        </p:blipFill>
+        <p:spPr>
+          <a:xfrm>
+            <a:off x="3375716" y="1937506"/>
+            <a:ext cx="721609" cy="721609"/>
+          </a:xfrm>
+          <a:prstGeom prst="rect">
+            <a:avLst/>
+          </a:prstGeom>
+        </p:spPr>
+      </p:pic>
+      <p:sp>
+        <p:nvSpPr>
+          <p:cNvPr id="7" name="TextBox 6">
+            <a:extLst>
+              <a:ext uri="{FF2B5EF4-FFF2-40B4-BE49-F238E27FC236}">
+                <a16:creationId xmlns:a16="http://schemas.microsoft.com/office/drawing/2014/main" id="{C95F0CDA-78B3-FE21-F423-F7C3BA262E22}"/>
+              </a:ext>
+            </a:extLst>
+          </p:cNvPr>
+          <p:cNvSpPr txBox="1"/>
+          <p:nvPr/>
+        </p:nvSpPr>
+        <p:spPr>
+          <a:xfrm>
+            <a:off x="5381297" y="2128493"/>
+            <a:ext cx="1855076" cy="923330"/>
+          </a:xfrm>
+          <a:prstGeom prst="rect">
+            <a:avLst/>
+          </a:prstGeom>
+          <a:noFill/>
+        </p:spPr>
+        <p:txBody>
+          <a:bodyPr wrap="square" rtlCol="0">
+            <a:spAutoFit/>
+          </a:bodyPr>
+          <a:lstStyle/>
+          <a:p>
+            <a:pPr algn="ctr"/>
+            <a:r>
+              <a:rPr lang="he-IL" dirty="0"/>
+              <a:t>הפסד בטוח</a:t>
+            </a:r>
+          </a:p>
+          <a:p>
+            <a:pPr algn="ctr"/>
+            <a:r>
+              <a:rPr lang="he-IL" dirty="0"/>
+              <a:t>₪</a:t>
+            </a:r>
+          </a:p>
+          <a:p>
+            <a:pPr algn="ctr"/>
+            <a:endParaRPr lang="en-US" dirty="0"/>
+          </a:p>
+        </p:txBody>
+      </p:sp>
+      <p:sp>
+        <p:nvSpPr>
+          <p:cNvPr id="9" name="TextBox 8">
+            <a:extLst>
+              <a:ext uri="{FF2B5EF4-FFF2-40B4-BE49-F238E27FC236}">
+                <a16:creationId xmlns:a16="http://schemas.microsoft.com/office/drawing/2014/main" id="{71CD924D-088C-EC79-8BE2-7FC35888E685}"/>
+              </a:ext>
+            </a:extLst>
+          </p:cNvPr>
+          <p:cNvSpPr txBox="1"/>
+          <p:nvPr/>
+        </p:nvSpPr>
+        <p:spPr>
+          <a:xfrm>
+            <a:off x="2461194" y="2694359"/>
+            <a:ext cx="1518745" cy="369332"/>
+          </a:xfrm>
+          <a:prstGeom prst="rect">
+            <a:avLst/>
+          </a:prstGeom>
+          <a:noFill/>
+        </p:spPr>
+        <p:txBody>
+          <a:bodyPr wrap="square">
+            <a:spAutoFit/>
+          </a:bodyPr>
+          <a:lstStyle/>
+          <a:p>
+            <a:pPr algn="ctr"/>
+            <a:r>
+              <a:rPr lang="he-IL" dirty="0"/>
+              <a:t>מטבע</a:t>
+            </a:r>
+          </a:p>
+        </p:txBody>
+      </p:sp>
+      <p:sp>
+        <p:nvSpPr>
+          <p:cNvPr id="10" name="TextBox 9">
+            <a:extLst>
+              <a:ext uri="{FF2B5EF4-FFF2-40B4-BE49-F238E27FC236}">
+                <a16:creationId xmlns:a16="http://schemas.microsoft.com/office/drawing/2014/main" id="{FD544692-7B7A-EFF9-F613-BD7396EF4B4A}"/>
+              </a:ext>
+            </a:extLst>
+          </p:cNvPr>
+          <p:cNvSpPr txBox="1"/>
+          <p:nvPr/>
+        </p:nvSpPr>
+        <p:spPr>
+          <a:xfrm>
+            <a:off x="1434662" y="3142593"/>
+            <a:ext cx="6516414" cy="2308324"/>
+          </a:xfrm>
+          <a:prstGeom prst="rect">
+            <a:avLst/>
+          </a:prstGeom>
+          <a:noFill/>
+        </p:spPr>
+        <p:txBody>
+          <a:bodyPr wrap="square" rtlCol="0">
+            <a:spAutoFit/>
+          </a:bodyPr>
+          <a:lstStyle/>
+          <a:p>
+            <a:pPr algn="r" rtl="1"/>
+            <a:r>
+              <a:rPr lang="he-IL" dirty="0"/>
+              <a:t>אם ברצונך להמר על תוצאת המטבע, </a:t>
+            </a:r>
+            <a:r>
+              <a:rPr lang="he-IL" dirty="0" err="1"/>
+              <a:t>לחצ</a:t>
+            </a:r>
+            <a:r>
+              <a:rPr lang="he-IL" dirty="0"/>
+              <a:t>/י </a:t>
+            </a:r>
+            <a:r>
+              <a:rPr lang="en-US" b="1" dirty="0"/>
+              <a:t>D</a:t>
+            </a:r>
+          </a:p>
+          <a:p>
+            <a:pPr algn="r" rtl="1"/>
+            <a:r>
+              <a:rPr lang="he-IL" dirty="0"/>
+              <a:t>אם ברצונך לקבל הפסד בטוח, בלי להמר, </a:t>
+            </a:r>
+            <a:r>
+              <a:rPr lang="he-IL" dirty="0" err="1"/>
+              <a:t>לחצ</a:t>
+            </a:r>
+            <a:r>
+              <a:rPr lang="he-IL" dirty="0"/>
+              <a:t>/י </a:t>
+            </a:r>
+            <a:r>
+              <a:rPr lang="en-US" b="1" dirty="0"/>
+              <a:t>K</a:t>
+            </a:r>
+          </a:p>
+          <a:p>
+            <a:pPr algn="r" rtl="1"/>
+            <a:endParaRPr lang="he-IL" dirty="0"/>
+          </a:p>
+          <a:p>
+            <a:pPr algn="r" rtl="1"/>
+            <a:endParaRPr lang="he-IL" dirty="0"/>
+          </a:p>
+          <a:p>
+            <a:pPr algn="r" rtl="1"/>
+            <a:r>
+              <a:rPr lang="he-IL" dirty="0"/>
+              <a:t>המטרה היא להפסיד כמה שפחות כסף.</a:t>
+            </a:r>
+          </a:p>
+          <a:p>
+            <a:pPr algn="r" rtl="1"/>
+            <a:endParaRPr lang="he-IL" dirty="0"/>
+          </a:p>
+          <a:p>
+            <a:pPr algn="r" rtl="1"/>
+            <a:r>
+              <a:rPr lang="he-IL" dirty="0"/>
+              <a:t>בסוף הניסוי, ייבחר באופן אקראי אחד מתוצאות </a:t>
+            </a:r>
+            <a:r>
+              <a:rPr lang="he-IL"/>
+              <a:t>השלב הזה והסכום </a:t>
+            </a:r>
+            <a:r>
+              <a:rPr lang="he-IL" dirty="0"/>
+              <a:t>בו יופחת מבונוס פוטנציאלי של 20 ₪. </a:t>
+            </a:r>
+            <a:endParaRPr lang="en-US" dirty="0"/>
+          </a:p>
+        </p:txBody>
+      </p:sp>
+    </p:spTree>
+    <p:extLst>
+      <p:ext uri="{BB962C8B-B14F-4D97-AF65-F5344CB8AC3E}">
+        <p14:creationId xmlns:p14="http://schemas.microsoft.com/office/powerpoint/2010/main" val="1907122730"/>
       </p:ext>
     </p:extLst>
   </p:cSld>

</xml_diff>